<commit_message>
changes made in class to pie chart and footer
</commit_message>
<xml_diff>
--- a/project3_group2.pptx
+++ b/project3_group2.pptx
@@ -266,7 +266,7 @@
           <a:p>
             <a:fld id="{4B7899CF-C8B2-459A-A108-3944FC02C513}" type="datetimeFigureOut">
               <a:rPr lang="en-GB" smtClean="0"/>
-              <a:t>09/02/2024</a:t>
+              <a:t>12/02/2024</a:t>
             </a:fld>
             <a:endParaRPr lang="en-GB"/>
           </a:p>
@@ -466,7 +466,7 @@
           <a:p>
             <a:fld id="{4B7899CF-C8B2-459A-A108-3944FC02C513}" type="datetimeFigureOut">
               <a:rPr lang="en-GB" smtClean="0"/>
-              <a:t>09/02/2024</a:t>
+              <a:t>12/02/2024</a:t>
             </a:fld>
             <a:endParaRPr lang="en-GB"/>
           </a:p>
@@ -676,7 +676,7 @@
           <a:p>
             <a:fld id="{4B7899CF-C8B2-459A-A108-3944FC02C513}" type="datetimeFigureOut">
               <a:rPr lang="en-GB" smtClean="0"/>
-              <a:t>09/02/2024</a:t>
+              <a:t>12/02/2024</a:t>
             </a:fld>
             <a:endParaRPr lang="en-GB"/>
           </a:p>
@@ -876,7 +876,7 @@
           <a:p>
             <a:fld id="{4B7899CF-C8B2-459A-A108-3944FC02C513}" type="datetimeFigureOut">
               <a:rPr lang="en-GB" smtClean="0"/>
-              <a:t>09/02/2024</a:t>
+              <a:t>12/02/2024</a:t>
             </a:fld>
             <a:endParaRPr lang="en-GB"/>
           </a:p>
@@ -1152,7 +1152,7 @@
           <a:p>
             <a:fld id="{4B7899CF-C8B2-459A-A108-3944FC02C513}" type="datetimeFigureOut">
               <a:rPr lang="en-GB" smtClean="0"/>
-              <a:t>09/02/2024</a:t>
+              <a:t>12/02/2024</a:t>
             </a:fld>
             <a:endParaRPr lang="en-GB"/>
           </a:p>
@@ -1420,7 +1420,7 @@
           <a:p>
             <a:fld id="{4B7899CF-C8B2-459A-A108-3944FC02C513}" type="datetimeFigureOut">
               <a:rPr lang="en-GB" smtClean="0"/>
-              <a:t>09/02/2024</a:t>
+              <a:t>12/02/2024</a:t>
             </a:fld>
             <a:endParaRPr lang="en-GB"/>
           </a:p>
@@ -1835,7 +1835,7 @@
           <a:p>
             <a:fld id="{4B7899CF-C8B2-459A-A108-3944FC02C513}" type="datetimeFigureOut">
               <a:rPr lang="en-GB" smtClean="0"/>
-              <a:t>09/02/2024</a:t>
+              <a:t>12/02/2024</a:t>
             </a:fld>
             <a:endParaRPr lang="en-GB"/>
           </a:p>
@@ -1977,7 +1977,7 @@
           <a:p>
             <a:fld id="{4B7899CF-C8B2-459A-A108-3944FC02C513}" type="datetimeFigureOut">
               <a:rPr lang="en-GB" smtClean="0"/>
-              <a:t>09/02/2024</a:t>
+              <a:t>12/02/2024</a:t>
             </a:fld>
             <a:endParaRPr lang="en-GB"/>
           </a:p>
@@ -2090,7 +2090,7 @@
           <a:p>
             <a:fld id="{4B7899CF-C8B2-459A-A108-3944FC02C513}" type="datetimeFigureOut">
               <a:rPr lang="en-GB" smtClean="0"/>
-              <a:t>09/02/2024</a:t>
+              <a:t>12/02/2024</a:t>
             </a:fld>
             <a:endParaRPr lang="en-GB"/>
           </a:p>
@@ -2403,7 +2403,7 @@
           <a:p>
             <a:fld id="{4B7899CF-C8B2-459A-A108-3944FC02C513}" type="datetimeFigureOut">
               <a:rPr lang="en-GB" smtClean="0"/>
-              <a:t>09/02/2024</a:t>
+              <a:t>12/02/2024</a:t>
             </a:fld>
             <a:endParaRPr lang="en-GB"/>
           </a:p>
@@ -2692,7 +2692,7 @@
           <a:p>
             <a:fld id="{4B7899CF-C8B2-459A-A108-3944FC02C513}" type="datetimeFigureOut">
               <a:rPr lang="en-GB" smtClean="0"/>
-              <a:t>09/02/2024</a:t>
+              <a:t>12/02/2024</a:t>
             </a:fld>
             <a:endParaRPr lang="en-GB"/>
           </a:p>
@@ -2935,7 +2935,7 @@
           <a:p>
             <a:fld id="{4B7899CF-C8B2-459A-A108-3944FC02C513}" type="datetimeFigureOut">
               <a:rPr lang="en-GB" smtClean="0"/>
-              <a:t>09/02/2024</a:t>
+              <a:t>12/02/2024</a:t>
             </a:fld>
             <a:endParaRPr lang="en-GB"/>
           </a:p>
@@ -3453,19 +3453,19 @@
         </p:nvSpPr>
         <p:spPr>
           <a:xfrm>
-            <a:off x="1679266" y="4780541"/>
-            <a:ext cx="3789881" cy="882904"/>
+            <a:off x="1477818" y="4780541"/>
+            <a:ext cx="3991329" cy="882904"/>
           </a:xfrm>
         </p:spPr>
         <p:txBody>
           <a:bodyPr>
-            <a:normAutofit/>
+            <a:noAutofit/>
           </a:bodyPr>
           <a:lstStyle/>
           <a:p>
             <a:pPr algn="r"/>
             <a:r>
-              <a:rPr lang="en-GB" dirty="0"/>
+              <a:rPr lang="en-GB" sz="3000" dirty="0"/>
               <a:t>Job and salary trends in data-related careers</a:t>
             </a:r>
           </a:p>
@@ -3847,8 +3847,8 @@
         </p:nvSpPr>
         <p:spPr>
           <a:xfrm>
-            <a:off x="1104014" y="1690688"/>
-            <a:ext cx="6134986" cy="2615524"/>
+            <a:off x="1104013" y="1690688"/>
+            <a:ext cx="3754313" cy="2615524"/>
           </a:xfrm>
           <a:prstGeom prst="rect">
             <a:avLst/>
@@ -3861,10 +3861,12 @@
           </a:bodyPr>
           <a:lstStyle/>
           <a:p>
-            <a:pPr algn="l">
+            <a:pPr marL="457200" indent="-457200" algn="l">
               <a:lnSpc>
                 <a:spcPct val="150000"/>
               </a:lnSpc>
+              <a:buFont typeface="Arial" panose="020B0604020202020204" pitchFamily="34" charset="0"/>
+              <a:buChar char="•"/>
             </a:pPr>
             <a:r>
               <a:rPr lang="en-GB" sz="2800" b="0" i="0" dirty="0">
@@ -3874,10 +3876,12 @@
             </a:r>
           </a:p>
           <a:p>
-            <a:pPr algn="l">
+            <a:pPr marL="457200" indent="-457200" algn="l">
               <a:lnSpc>
                 <a:spcPct val="150000"/>
               </a:lnSpc>
+              <a:buFont typeface="Arial" panose="020B0604020202020204" pitchFamily="34" charset="0"/>
+              <a:buChar char="•"/>
             </a:pPr>
             <a:r>
               <a:rPr lang="en-GB" sz="2800" b="0" i="0" dirty="0" err="1">
@@ -3914,10 +3918,12 @@
             </a:endParaRPr>
           </a:p>
           <a:p>
-            <a:pPr algn="l">
+            <a:pPr marL="457200" indent="-457200" algn="l">
               <a:lnSpc>
                 <a:spcPct val="150000"/>
               </a:lnSpc>
+              <a:buFont typeface="Arial" panose="020B0604020202020204" pitchFamily="34" charset="0"/>
+              <a:buChar char="•"/>
             </a:pPr>
             <a:r>
               <a:rPr lang="en-GB" sz="2800" b="0" i="0" dirty="0">
@@ -3936,10 +3942,12 @@
             </a:endParaRPr>
           </a:p>
           <a:p>
-            <a:pPr algn="l">
+            <a:pPr marL="457200" indent="-457200" algn="l">
               <a:lnSpc>
                 <a:spcPct val="150000"/>
               </a:lnSpc>
+              <a:buFont typeface="Arial" panose="020B0604020202020204" pitchFamily="34" charset="0"/>
+              <a:buChar char="•"/>
             </a:pPr>
             <a:r>
               <a:rPr lang="en-GB" sz="2800" b="0" i="0" dirty="0">
@@ -3964,8 +3972,8 @@
         </p:nvSpPr>
         <p:spPr>
           <a:xfrm rot="16200000" flipV="1">
-            <a:off x="-2179640" y="2798168"/>
-            <a:ext cx="5932968" cy="102713"/>
+            <a:off x="150214" y="976549"/>
+            <a:ext cx="1088531" cy="102713"/>
           </a:xfrm>
           <a:prstGeom prst="mathMinus">
             <a:avLst/>
@@ -5646,7 +5654,7 @@
         </p:blipFill>
         <p:spPr>
           <a:xfrm>
-            <a:off x="5904496" y="669636"/>
+            <a:off x="5886024" y="669636"/>
             <a:ext cx="5837382" cy="5260109"/>
           </a:xfrm>
           <a:prstGeom prst="rect">

</xml_diff>